<commit_message>
edcl lesson 4 starter update
Former-commit-id: 26c658e088bf12d59c25efafbd4c123f50875db2
</commit_message>
<xml_diff>
--- a/07pat/ECDLtable.pptx
+++ b/07pat/ECDLtable.pptx
@@ -399,7 +399,7 @@
           <a:blip r:embed="rId2" cstate="print">
             <a:extLst>
               <a:ext uri="{28A0092B-C50C-407E-A947-70E740481C1C}">
-                <a14:useLocalDpi xmlns="" xmlns:a14="http://schemas.microsoft.com/office/drawing/2010/main" val="0"/>
+                <a14:useLocalDpi xmlns:a14="http://schemas.microsoft.com/office/drawing/2010/main" xmlns="" val="0"/>
               </a:ext>
             </a:extLst>
           </a:blip>
@@ -417,7 +417,7 @@
           <a:noFill/>
           <a:extLst>
             <a:ext uri="{909E8E84-426E-40DD-AFC4-6F175D3DCCD1}">
-              <a14:hiddenFill xmlns="" xmlns:a14="http://schemas.microsoft.com/office/drawing/2010/main">
+              <a14:hiddenFill xmlns:a14="http://schemas.microsoft.com/office/drawing/2010/main" xmlns="">
                 <a:solidFill>
                   <a:srgbClr val="FFFFFF"/>
                 </a:solidFill>
@@ -963,7 +963,7 @@
           <a:blip r:embed="rId2" cstate="print">
             <a:extLst>
               <a:ext uri="{28A0092B-C50C-407E-A947-70E740481C1C}">
-                <a14:useLocalDpi xmlns="" xmlns:a14="http://schemas.microsoft.com/office/drawing/2010/main" val="0"/>
+                <a14:useLocalDpi xmlns:a14="http://schemas.microsoft.com/office/drawing/2010/main" xmlns="" val="0"/>
               </a:ext>
             </a:extLst>
           </a:blip>
@@ -981,7 +981,7 @@
           <a:noFill/>
           <a:extLst>
             <a:ext uri="{909E8E84-426E-40DD-AFC4-6F175D3DCCD1}">
-              <a14:hiddenFill xmlns="" xmlns:a14="http://schemas.microsoft.com/office/drawing/2010/main">
+              <a14:hiddenFill xmlns:a14="http://schemas.microsoft.com/office/drawing/2010/main" xmlns="">
                 <a:solidFill>
                   <a:srgbClr val="FFFFFF"/>
                 </a:solidFill>
@@ -3551,7 +3551,7 @@
     </p:spTree>
     <p:extLst>
       <p:ext uri="{BB962C8B-B14F-4D97-AF65-F5344CB8AC3E}">
-        <p14:creationId xmlns="" xmlns:p14="http://schemas.microsoft.com/office/powerpoint/2010/main" val="4082318503"/>
+        <p14:creationId xmlns:p14="http://schemas.microsoft.com/office/powerpoint/2010/main" xmlns="" val="4082318503"/>
       </p:ext>
     </p:extLst>
   </p:cSld>
@@ -3686,7 +3686,7 @@
           <a:blip r:embed="rId2" cstate="print">
             <a:extLst>
               <a:ext uri="{28A0092B-C50C-407E-A947-70E740481C1C}">
-                <a14:useLocalDpi xmlns="" xmlns:a14="http://schemas.microsoft.com/office/drawing/2010/main" val="0"/>
+                <a14:useLocalDpi xmlns:a14="http://schemas.microsoft.com/office/drawing/2010/main" xmlns="" val="0"/>
               </a:ext>
             </a:extLst>
           </a:blip>
@@ -3706,7 +3706,7 @@
           <a:noFill/>
           <a:extLst>
             <a:ext uri="{909E8E84-426E-40DD-AFC4-6F175D3DCCD1}">
-              <a14:hiddenFill xmlns="" xmlns:a14="http://schemas.microsoft.com/office/drawing/2010/main">
+              <a14:hiddenFill xmlns:a14="http://schemas.microsoft.com/office/drawing/2010/main" xmlns="">
                 <a:solidFill>
                   <a:srgbClr val="FFFFFF"/>
                 </a:solidFill>
@@ -3718,7 +3718,7 @@
     </p:spTree>
     <p:extLst>
       <p:ext uri="{BB962C8B-B14F-4D97-AF65-F5344CB8AC3E}">
-        <p14:creationId xmlns="" xmlns:p14="http://schemas.microsoft.com/office/powerpoint/2010/main" val="1616724772"/>
+        <p14:creationId xmlns:p14="http://schemas.microsoft.com/office/powerpoint/2010/main" xmlns="" val="1616724772"/>
       </p:ext>
     </p:extLst>
   </p:cSld>
@@ -4268,44 +4268,35 @@
             <p:ph idx="1"/>
           </p:nvPr>
         </p:nvSpPr>
-        <p:spPr/>
+        <p:spPr>
+          <a:xfrm>
+            <a:off x="3313997" y="1340768"/>
+            <a:ext cx="5544616" cy="5136232"/>
+          </a:xfrm>
+        </p:spPr>
         <p:txBody>
           <a:bodyPr>
             <a:normAutofit/>
           </a:bodyPr>
           <a:lstStyle/>
           <a:p>
-            <a:pPr marL="0" indent="0">
-              <a:buNone/>
-            </a:pPr>
-            <a:endParaRPr lang="en-GB" sz="2800" dirty="0" smtClean="0"/>
-          </a:p>
-          <a:p>
-            <a:pPr marL="0" indent="0">
-              <a:buNone/>
-            </a:pPr>
-            <a:endParaRPr lang="en-GB" sz="2800" dirty="0" smtClean="0"/>
-          </a:p>
-          <a:p>
-            <a:pPr marL="0" indent="0">
-              <a:buNone/>
-            </a:pPr>
-            <a:r>
-              <a:rPr lang="en-GB" sz="2800" dirty="0" smtClean="0"/>
+            <a:pPr lvl="0"/>
+            <a:r>
+              <a:rPr lang="en-GB" sz="2400" dirty="0" smtClean="0"/>
               <a:t>Watch the YouTube video from the web page for this lesson</a:t>
             </a:r>
           </a:p>
           <a:p>
-            <a:pPr marL="0" indent="0">
-              <a:buNone/>
-            </a:pPr>
-            <a:endParaRPr lang="en-GB" sz="2800" dirty="0" smtClean="0"/>
-          </a:p>
-          <a:p>
-            <a:endParaRPr lang="en-GB" sz="2800" dirty="0"/>
-          </a:p>
-          <a:p>
-            <a:endParaRPr lang="en-GB" sz="2800" dirty="0"/>
+            <a:pPr lvl="0"/>
+            <a:endParaRPr lang="en-GB" dirty="0" smtClean="0"/>
+          </a:p>
+          <a:p>
+            <a:pPr lvl="0"/>
+            <a:r>
+              <a:rPr lang="en-GB" dirty="0" smtClean="0"/>
+              <a:t>Read the Web based lesson at http://www.gcflearnfree.org/office2013/powerpoint2013/23</a:t>
+            </a:r>
+            <a:endParaRPr lang="en-GB" sz="2400" dirty="0" smtClean="0"/>
           </a:p>
         </p:txBody>
       </p:sp>
@@ -4321,7 +4312,7 @@
           <a:blip r:embed="rId2" cstate="print">
             <a:extLst>
               <a:ext uri="{28A0092B-C50C-407E-A947-70E740481C1C}">
-                <a14:useLocalDpi xmlns="" xmlns:a14="http://schemas.microsoft.com/office/drawing/2010/main" val="0"/>
+                <a14:useLocalDpi xmlns:a14="http://schemas.microsoft.com/office/drawing/2010/main" xmlns="" val="0"/>
               </a:ext>
             </a:extLst>
           </a:blip>
@@ -4341,7 +4332,7 @@
           <a:noFill/>
           <a:extLst>
             <a:ext uri="{909E8E84-426E-40DD-AFC4-6F175D3DCCD1}">
-              <a14:hiddenFill xmlns="" xmlns:a14="http://schemas.microsoft.com/office/drawing/2010/main">
+              <a14:hiddenFill xmlns:a14="http://schemas.microsoft.com/office/drawing/2010/main" xmlns="">
                 <a:solidFill>
                   <a:srgbClr val="FFFFFF"/>
                 </a:solidFill>
@@ -4353,7 +4344,7 @@
     </p:spTree>
     <p:extLst>
       <p:ext uri="{BB962C8B-B14F-4D97-AF65-F5344CB8AC3E}">
-        <p14:creationId xmlns="" xmlns:p14="http://schemas.microsoft.com/office/powerpoint/2010/main" val="970620059"/>
+        <p14:creationId xmlns:p14="http://schemas.microsoft.com/office/powerpoint/2010/main" xmlns="" val="970620059"/>
       </p:ext>
     </p:extLst>
   </p:cSld>
@@ -4476,7 +4467,7 @@
           <a:blip r:embed="rId2" cstate="print">
             <a:extLst>
               <a:ext uri="{28A0092B-C50C-407E-A947-70E740481C1C}">
-                <a14:useLocalDpi xmlns="" xmlns:a14="http://schemas.microsoft.com/office/drawing/2010/main" val="0"/>
+                <a14:useLocalDpi xmlns:a14="http://schemas.microsoft.com/office/drawing/2010/main" xmlns="" val="0"/>
               </a:ext>
             </a:extLst>
           </a:blip>
@@ -4496,7 +4487,7 @@
           <a:noFill/>
           <a:extLst>
             <a:ext uri="{909E8E84-426E-40DD-AFC4-6F175D3DCCD1}">
-              <a14:hiddenFill xmlns="" xmlns:a14="http://schemas.microsoft.com/office/drawing/2010/main">
+              <a14:hiddenFill xmlns:a14="http://schemas.microsoft.com/office/drawing/2010/main" xmlns="">
                 <a:solidFill>
                   <a:srgbClr val="FFFFFF"/>
                 </a:solidFill>
@@ -4554,7 +4545,7 @@
     </p:spTree>
     <p:extLst>
       <p:ext uri="{BB962C8B-B14F-4D97-AF65-F5344CB8AC3E}">
-        <p14:creationId xmlns="" xmlns:p14="http://schemas.microsoft.com/office/powerpoint/2010/main" val="588990593"/>
+        <p14:creationId xmlns:p14="http://schemas.microsoft.com/office/powerpoint/2010/main" xmlns="" val="588990593"/>
       </p:ext>
     </p:extLst>
   </p:cSld>
@@ -4715,7 +4706,7 @@
           <a:blip r:embed="rId2" cstate="print">
             <a:extLst>
               <a:ext uri="{28A0092B-C50C-407E-A947-70E740481C1C}">
-                <a14:useLocalDpi xmlns="" xmlns:a14="http://schemas.microsoft.com/office/drawing/2010/main" val="0"/>
+                <a14:useLocalDpi xmlns:a14="http://schemas.microsoft.com/office/drawing/2010/main" xmlns="" val="0"/>
               </a:ext>
             </a:extLst>
           </a:blip>
@@ -4735,7 +4726,7 @@
           <a:noFill/>
           <a:extLst>
             <a:ext uri="{909E8E84-426E-40DD-AFC4-6F175D3DCCD1}">
-              <a14:hiddenFill xmlns="" xmlns:a14="http://schemas.microsoft.com/office/drawing/2010/main">
+              <a14:hiddenFill xmlns:a14="http://schemas.microsoft.com/office/drawing/2010/main" xmlns="">
                 <a:solidFill>
                   <a:srgbClr val="FFFFFF"/>
                 </a:solidFill>
@@ -4747,7 +4738,7 @@
     </p:spTree>
     <p:extLst>
       <p:ext uri="{BB962C8B-B14F-4D97-AF65-F5344CB8AC3E}">
-        <p14:creationId xmlns="" xmlns:p14="http://schemas.microsoft.com/office/powerpoint/2010/main" val="596547194"/>
+        <p14:creationId xmlns:p14="http://schemas.microsoft.com/office/powerpoint/2010/main" xmlns="" val="596547194"/>
       </p:ext>
     </p:extLst>
   </p:cSld>
@@ -4890,7 +4881,7 @@
           <a:blip r:embed="rId2" cstate="print">
             <a:extLst>
               <a:ext uri="{28A0092B-C50C-407E-A947-70E740481C1C}">
-                <a14:useLocalDpi xmlns="" xmlns:a14="http://schemas.microsoft.com/office/drawing/2010/main" val="0"/>
+                <a14:useLocalDpi xmlns:a14="http://schemas.microsoft.com/office/drawing/2010/main" xmlns="" val="0"/>
               </a:ext>
             </a:extLst>
           </a:blip>
@@ -4910,7 +4901,7 @@
           <a:noFill/>
           <a:extLst>
             <a:ext uri="{909E8E84-426E-40DD-AFC4-6F175D3DCCD1}">
-              <a14:hiddenFill xmlns="" xmlns:a14="http://schemas.microsoft.com/office/drawing/2010/main">
+              <a14:hiddenFill xmlns:a14="http://schemas.microsoft.com/office/drawing/2010/main" xmlns="">
                 <a:solidFill>
                   <a:srgbClr val="FFFFFF"/>
                 </a:solidFill>
@@ -4922,7 +4913,7 @@
     </p:spTree>
     <p:extLst>
       <p:ext uri="{BB962C8B-B14F-4D97-AF65-F5344CB8AC3E}">
-        <p14:creationId xmlns="" xmlns:p14="http://schemas.microsoft.com/office/powerpoint/2010/main" val="3258433848"/>
+        <p14:creationId xmlns:p14="http://schemas.microsoft.com/office/powerpoint/2010/main" xmlns="" val="3258433848"/>
       </p:ext>
     </p:extLst>
   </p:cSld>

</xml_diff>